<commit_message>
modelo workbench alterado pra mostrar indexes tbm
</commit_message>
<xml_diff>
--- a/documentação/CliniSoftware.pptx
+++ b/documentação/CliniSoftware.pptx
@@ -5649,8 +5649,8 @@
         </p:blipFill>
         <p:spPr>
           <a:xfrm>
-            <a:off x="2502054" y="0"/>
-            <a:ext cx="4139889" cy="5143498"/>
+            <a:off x="2561221" y="0"/>
+            <a:ext cx="4021558" cy="5143501"/>
           </a:xfrm>
           <a:prstGeom prst="rect">
             <a:avLst/>

</xml_diff>